<commit_message>
Updated documentation Updated images Added start.S to demo project Reverted CMake build directory for Linux scripts (we still build on the command line to cmake-build) Add load command to GDB command script Pass executable to GDB in startgdb.bat/sh Correct CMakeLists.txt for 00-build Update baremetal.ld with comments Update main CMakeLists.txt with comments, use configuration name as directory
</commit_message>
<xml_diff>
--- a/doc/images/project-structure-initial.pptx
+++ b/doc/images/project-structure-initial.pptx
@@ -288,7 +288,8 @@
           <a:p>
             <a:fld id="{464958D0-047A-4B5C-B600-9D705598A485}" type="datetimeFigureOut">
               <a:rPr lang="en-US" smtClean="0"/>
-              <a:t>12/10/2023</a:t>
+              <a:pPr/>
+              <a:t>12/18/2023</a:t>
             </a:fld>
             <a:endParaRPr lang="en-US"/>
           </a:p>
@@ -330,6 +331,7 @@
           <a:p>
             <a:fld id="{8C2A2864-06FB-4F8A-BB0D-DBB9F86FB9AC}" type="slidenum">
               <a:rPr lang="en-US" smtClean="0"/>
+              <a:pPr/>
               <a:t>‹#›</a:t>
             </a:fld>
             <a:endParaRPr lang="en-US"/>
@@ -453,7 +455,8 @@
           <a:p>
             <a:fld id="{464958D0-047A-4B5C-B600-9D705598A485}" type="datetimeFigureOut">
               <a:rPr lang="en-US" smtClean="0"/>
-              <a:t>12/10/2023</a:t>
+              <a:pPr/>
+              <a:t>12/18/2023</a:t>
             </a:fld>
             <a:endParaRPr lang="en-US"/>
           </a:p>
@@ -495,6 +498,7 @@
           <a:p>
             <a:fld id="{8C2A2864-06FB-4F8A-BB0D-DBB9F86FB9AC}" type="slidenum">
               <a:rPr lang="en-US" smtClean="0"/>
+              <a:pPr/>
               <a:t>‹#›</a:t>
             </a:fld>
             <a:endParaRPr lang="en-US"/>
@@ -628,7 +632,8 @@
           <a:p>
             <a:fld id="{464958D0-047A-4B5C-B600-9D705598A485}" type="datetimeFigureOut">
               <a:rPr lang="en-US" smtClean="0"/>
-              <a:t>12/10/2023</a:t>
+              <a:pPr/>
+              <a:t>12/18/2023</a:t>
             </a:fld>
             <a:endParaRPr lang="en-US"/>
           </a:p>
@@ -670,6 +675,7 @@
           <a:p>
             <a:fld id="{8C2A2864-06FB-4F8A-BB0D-DBB9F86FB9AC}" type="slidenum">
               <a:rPr lang="en-US" smtClean="0"/>
+              <a:pPr/>
               <a:t>‹#›</a:t>
             </a:fld>
             <a:endParaRPr lang="en-US"/>
@@ -793,7 +799,8 @@
           <a:p>
             <a:fld id="{464958D0-047A-4B5C-B600-9D705598A485}" type="datetimeFigureOut">
               <a:rPr lang="en-US" smtClean="0"/>
-              <a:t>12/10/2023</a:t>
+              <a:pPr/>
+              <a:t>12/18/2023</a:t>
             </a:fld>
             <a:endParaRPr lang="en-US"/>
           </a:p>
@@ -835,6 +842,7 @@
           <a:p>
             <a:fld id="{8C2A2864-06FB-4F8A-BB0D-DBB9F86FB9AC}" type="slidenum">
               <a:rPr lang="en-US" smtClean="0"/>
+              <a:pPr/>
               <a:t>‹#›</a:t>
             </a:fld>
             <a:endParaRPr lang="en-US"/>
@@ -1034,7 +1042,8 @@
           <a:p>
             <a:fld id="{464958D0-047A-4B5C-B600-9D705598A485}" type="datetimeFigureOut">
               <a:rPr lang="en-US" smtClean="0"/>
-              <a:t>12/10/2023</a:t>
+              <a:pPr/>
+              <a:t>12/18/2023</a:t>
             </a:fld>
             <a:endParaRPr lang="en-US"/>
           </a:p>
@@ -1076,6 +1085,7 @@
           <a:p>
             <a:fld id="{8C2A2864-06FB-4F8A-BB0D-DBB9F86FB9AC}" type="slidenum">
               <a:rPr lang="en-US" smtClean="0"/>
+              <a:pPr/>
               <a:t>‹#›</a:t>
             </a:fld>
             <a:endParaRPr lang="en-US"/>
@@ -1317,7 +1327,8 @@
           <a:p>
             <a:fld id="{464958D0-047A-4B5C-B600-9D705598A485}" type="datetimeFigureOut">
               <a:rPr lang="en-US" smtClean="0"/>
-              <a:t>12/10/2023</a:t>
+              <a:pPr/>
+              <a:t>12/18/2023</a:t>
             </a:fld>
             <a:endParaRPr lang="en-US"/>
           </a:p>
@@ -1359,6 +1370,7 @@
           <a:p>
             <a:fld id="{8C2A2864-06FB-4F8A-BB0D-DBB9F86FB9AC}" type="slidenum">
               <a:rPr lang="en-US" smtClean="0"/>
+              <a:pPr/>
               <a:t>‹#›</a:t>
             </a:fld>
             <a:endParaRPr lang="en-US"/>
@@ -1734,7 +1746,8 @@
           <a:p>
             <a:fld id="{464958D0-047A-4B5C-B600-9D705598A485}" type="datetimeFigureOut">
               <a:rPr lang="en-US" smtClean="0"/>
-              <a:t>12/10/2023</a:t>
+              <a:pPr/>
+              <a:t>12/18/2023</a:t>
             </a:fld>
             <a:endParaRPr lang="en-US"/>
           </a:p>
@@ -1776,6 +1789,7 @@
           <a:p>
             <a:fld id="{8C2A2864-06FB-4F8A-BB0D-DBB9F86FB9AC}" type="slidenum">
               <a:rPr lang="en-US" smtClean="0"/>
+              <a:pPr/>
               <a:t>‹#›</a:t>
             </a:fld>
             <a:endParaRPr lang="en-US"/>
@@ -1847,7 +1861,8 @@
           <a:p>
             <a:fld id="{464958D0-047A-4B5C-B600-9D705598A485}" type="datetimeFigureOut">
               <a:rPr lang="en-US" smtClean="0"/>
-              <a:t>12/10/2023</a:t>
+              <a:pPr/>
+              <a:t>12/18/2023</a:t>
             </a:fld>
             <a:endParaRPr lang="en-US"/>
           </a:p>
@@ -1889,6 +1904,7 @@
           <a:p>
             <a:fld id="{8C2A2864-06FB-4F8A-BB0D-DBB9F86FB9AC}" type="slidenum">
               <a:rPr lang="en-US" smtClean="0"/>
+              <a:pPr/>
               <a:t>‹#›</a:t>
             </a:fld>
             <a:endParaRPr lang="en-US"/>
@@ -1937,7 +1953,8 @@
           <a:p>
             <a:fld id="{464958D0-047A-4B5C-B600-9D705598A485}" type="datetimeFigureOut">
               <a:rPr lang="en-US" smtClean="0"/>
-              <a:t>12/10/2023</a:t>
+              <a:pPr/>
+              <a:t>12/18/2023</a:t>
             </a:fld>
             <a:endParaRPr lang="en-US"/>
           </a:p>
@@ -1979,6 +1996,7 @@
           <a:p>
             <a:fld id="{8C2A2864-06FB-4F8A-BB0D-DBB9F86FB9AC}" type="slidenum">
               <a:rPr lang="en-US" smtClean="0"/>
+              <a:pPr/>
               <a:t>‹#›</a:t>
             </a:fld>
             <a:endParaRPr lang="en-US"/>
@@ -2209,7 +2227,8 @@
           <a:p>
             <a:fld id="{464958D0-047A-4B5C-B600-9D705598A485}" type="datetimeFigureOut">
               <a:rPr lang="en-US" smtClean="0"/>
-              <a:t>12/10/2023</a:t>
+              <a:pPr/>
+              <a:t>12/18/2023</a:t>
             </a:fld>
             <a:endParaRPr lang="en-US"/>
           </a:p>
@@ -2251,6 +2270,7 @@
           <a:p>
             <a:fld id="{8C2A2864-06FB-4F8A-BB0D-DBB9F86FB9AC}" type="slidenum">
               <a:rPr lang="en-US" smtClean="0"/>
+              <a:pPr/>
               <a:t>‹#›</a:t>
             </a:fld>
             <a:endParaRPr lang="en-US"/>
@@ -2457,7 +2477,8 @@
           <a:p>
             <a:fld id="{464958D0-047A-4B5C-B600-9D705598A485}" type="datetimeFigureOut">
               <a:rPr lang="en-US" smtClean="0"/>
-              <a:t>12/10/2023</a:t>
+              <a:pPr/>
+              <a:t>12/18/2023</a:t>
             </a:fld>
             <a:endParaRPr lang="en-US"/>
           </a:p>
@@ -2499,6 +2520,7 @@
           <a:p>
             <a:fld id="{8C2A2864-06FB-4F8A-BB0D-DBB9F86FB9AC}" type="slidenum">
               <a:rPr lang="en-US" smtClean="0"/>
+              <a:pPr/>
               <a:t>‹#›</a:t>
             </a:fld>
             <a:endParaRPr lang="en-US"/>
@@ -2665,7 +2687,8 @@
           <a:p>
             <a:fld id="{464958D0-047A-4B5C-B600-9D705598A485}" type="datetimeFigureOut">
               <a:rPr lang="en-US" smtClean="0"/>
-              <a:t>12/10/2023</a:t>
+              <a:pPr/>
+              <a:t>12/18/2023</a:t>
             </a:fld>
             <a:endParaRPr lang="en-US"/>
           </a:p>
@@ -2743,6 +2766,7 @@
           <a:p>
             <a:fld id="{8C2A2864-06FB-4F8A-BB0D-DBB9F86FB9AC}" type="slidenum">
               <a:rPr lang="en-US" smtClean="0"/>
+              <a:pPr/>
               <a:t>‹#›</a:t>
             </a:fld>
             <a:endParaRPr lang="en-US"/>
@@ -4167,7 +4191,7 @@
         </p:nvSpPr>
         <p:spPr>
           <a:xfrm>
-            <a:off x="3810000" y="5257800"/>
+            <a:off x="3810000" y="5715000"/>
             <a:ext cx="1371600" cy="381000"/>
           </a:xfrm>
           <a:prstGeom prst="snip1Rect">
@@ -4233,7 +4257,7 @@
         </p:nvSpPr>
         <p:spPr>
           <a:xfrm>
-            <a:off x="3810000" y="5715000"/>
+            <a:off x="3810000" y="6172200"/>
             <a:ext cx="1371600" cy="381000"/>
           </a:xfrm>
           <a:prstGeom prst="snip1Rect">
@@ -5003,7 +5027,7 @@
         <p:spPr>
           <a:xfrm>
             <a:off x="3429000" y="3619500"/>
-            <a:ext cx="381000" cy="1828800"/>
+            <a:ext cx="381000" cy="2286000"/>
           </a:xfrm>
           <a:prstGeom prst="bentConnector3">
             <a:avLst>
@@ -5038,13 +5062,274 @@
         <p:spPr>
           <a:xfrm>
             <a:off x="3429000" y="3619500"/>
-            <a:ext cx="381000" cy="2286000"/>
+            <a:ext cx="381000" cy="2743200"/>
           </a:xfrm>
           <a:prstGeom prst="bentConnector3">
             <a:avLst>
               <a:gd name="adj1" fmla="val 50000"/>
             </a:avLst>
           </a:prstGeom>
+        </p:spPr>
+        <p:style>
+          <a:lnRef idx="1">
+            <a:schemeClr val="accent1"/>
+          </a:lnRef>
+          <a:fillRef idx="0">
+            <a:schemeClr val="accent1"/>
+          </a:fillRef>
+          <a:effectRef idx="0">
+            <a:schemeClr val="accent1"/>
+          </a:effectRef>
+          <a:fontRef idx="minor">
+            <a:schemeClr val="tx1"/>
+          </a:fontRef>
+        </p:style>
+      </p:cxnSp>
+      <p:cxnSp>
+        <p:nvCxnSpPr>
+          <p:cNvPr id="51" name="Curved Connector 50"/>
+          <p:cNvCxnSpPr>
+            <a:stCxn id="27" idx="0"/>
+            <a:endCxn id="18" idx="0"/>
+          </p:cNvCxnSpPr>
+          <p:nvPr/>
+        </p:nvCxnSpPr>
+        <p:spPr>
+          <a:xfrm flipV="1">
+            <a:off x="5181600" y="1562100"/>
+            <a:ext cx="1219200" cy="3429000"/>
+          </a:xfrm>
+          <a:prstGeom prst="curvedConnector3">
+            <a:avLst>
+              <a:gd name="adj1" fmla="val 236607"/>
+            </a:avLst>
+          </a:prstGeom>
+          <a:ln w="25400">
+            <a:tailEnd type="triangle" w="lg" len="lg"/>
+          </a:ln>
+        </p:spPr>
+        <p:style>
+          <a:lnRef idx="1">
+            <a:schemeClr val="accent1"/>
+          </a:lnRef>
+          <a:fillRef idx="0">
+            <a:schemeClr val="accent1"/>
+          </a:fillRef>
+          <a:effectRef idx="0">
+            <a:schemeClr val="accent1"/>
+          </a:effectRef>
+          <a:fontRef idx="minor">
+            <a:schemeClr val="tx1"/>
+          </a:fontRef>
+        </p:style>
+      </p:cxnSp>
+      <p:sp>
+        <p:nvSpPr>
+          <p:cNvPr id="61" name="Snip Single Corner Rectangle 60"/>
+          <p:cNvSpPr/>
+          <p:nvPr/>
+        </p:nvSpPr>
+        <p:spPr>
+          <a:xfrm>
+            <a:off x="3810000" y="5257800"/>
+            <a:ext cx="1371600" cy="381000"/>
+          </a:xfrm>
+          <a:prstGeom prst="snip1Rect">
+            <a:avLst/>
+          </a:prstGeom>
+          <a:solidFill>
+            <a:schemeClr val="accent1">
+              <a:lumMod val="40000"/>
+              <a:lumOff val="60000"/>
+            </a:schemeClr>
+          </a:solidFill>
+          <a:ln>
+            <a:solidFill>
+              <a:schemeClr val="accent1">
+                <a:lumMod val="60000"/>
+                <a:lumOff val="40000"/>
+              </a:schemeClr>
+            </a:solidFill>
+          </a:ln>
+        </p:spPr>
+        <p:style>
+          <a:lnRef idx="2">
+            <a:schemeClr val="accent1">
+              <a:shade val="50000"/>
+            </a:schemeClr>
+          </a:lnRef>
+          <a:fillRef idx="1">
+            <a:schemeClr val="accent1"/>
+          </a:fillRef>
+          <a:effectRef idx="0">
+            <a:schemeClr val="accent1"/>
+          </a:effectRef>
+          <a:fontRef idx="minor">
+            <a:schemeClr val="lt1"/>
+          </a:fontRef>
+        </p:style>
+        <p:txBody>
+          <a:bodyPr rtlCol="0" anchor="ctr"/>
+          <a:lstStyle/>
+          <a:p>
+            <a:pPr algn="ctr"/>
+            <a:r>
+              <a:rPr lang="en-US" sz="1100" dirty="0" err="1" smtClean="0">
+                <a:solidFill>
+                  <a:schemeClr val="tx1"/>
+                </a:solidFill>
+              </a:rPr>
+              <a:t>s</a:t>
+            </a:r>
+            <a:r>
+              <a:rPr lang="en-US" sz="1100" dirty="0" err="1" smtClean="0">
+                <a:solidFill>
+                  <a:schemeClr val="tx1"/>
+                </a:solidFill>
+              </a:rPr>
+              <a:t>tart.S</a:t>
+            </a:r>
+            <a:endParaRPr lang="en-US" sz="1100" dirty="0">
+              <a:solidFill>
+                <a:schemeClr val="tx1"/>
+              </a:solidFill>
+            </a:endParaRPr>
+          </a:p>
+        </p:txBody>
+      </p:sp>
+      <p:cxnSp>
+        <p:nvCxnSpPr>
+          <p:cNvPr id="63" name="Elbow Connector 62"/>
+          <p:cNvCxnSpPr>
+            <a:stCxn id="21" idx="3"/>
+            <a:endCxn id="61" idx="2"/>
+          </p:cNvCxnSpPr>
+          <p:nvPr/>
+        </p:nvCxnSpPr>
+        <p:spPr>
+          <a:xfrm>
+            <a:off x="3429000" y="3619500"/>
+            <a:ext cx="381000" cy="1828800"/>
+          </a:xfrm>
+          <a:prstGeom prst="bentConnector3">
+            <a:avLst>
+              <a:gd name="adj1" fmla="val 50000"/>
+            </a:avLst>
+          </a:prstGeom>
+        </p:spPr>
+        <p:style>
+          <a:lnRef idx="1">
+            <a:schemeClr val="accent1"/>
+          </a:lnRef>
+          <a:fillRef idx="0">
+            <a:schemeClr val="accent1"/>
+          </a:fillRef>
+          <a:effectRef idx="0">
+            <a:schemeClr val="accent1"/>
+          </a:effectRef>
+          <a:fontRef idx="minor">
+            <a:schemeClr val="tx1"/>
+          </a:fontRef>
+        </p:style>
+      </p:cxnSp>
+      <p:cxnSp>
+        <p:nvCxnSpPr>
+          <p:cNvPr id="69" name="Curved Connector 68"/>
+          <p:cNvCxnSpPr>
+            <a:stCxn id="61" idx="0"/>
+            <a:endCxn id="18" idx="0"/>
+          </p:cNvCxnSpPr>
+          <p:nvPr/>
+        </p:nvCxnSpPr>
+        <p:spPr>
+          <a:xfrm flipV="1">
+            <a:off x="5181600" y="1562100"/>
+            <a:ext cx="1219200" cy="3886200"/>
+          </a:xfrm>
+          <a:prstGeom prst="curvedConnector3">
+            <a:avLst>
+              <a:gd name="adj1" fmla="val 255179"/>
+            </a:avLst>
+          </a:prstGeom>
+          <a:ln w="25400">
+            <a:tailEnd type="triangle" w="lg" len="lg"/>
+          </a:ln>
+        </p:spPr>
+        <p:style>
+          <a:lnRef idx="1">
+            <a:schemeClr val="accent1"/>
+          </a:lnRef>
+          <a:fillRef idx="0">
+            <a:schemeClr val="accent1"/>
+          </a:fillRef>
+          <a:effectRef idx="0">
+            <a:schemeClr val="accent1"/>
+          </a:effectRef>
+          <a:fontRef idx="minor">
+            <a:schemeClr val="tx1"/>
+          </a:fontRef>
+        </p:style>
+      </p:cxnSp>
+      <p:cxnSp>
+        <p:nvCxnSpPr>
+          <p:cNvPr id="77" name="Curved Connector 76"/>
+          <p:cNvCxnSpPr>
+            <a:stCxn id="18" idx="0"/>
+            <a:endCxn id="19" idx="0"/>
+          </p:cNvCxnSpPr>
+          <p:nvPr/>
+        </p:nvCxnSpPr>
+        <p:spPr>
+          <a:xfrm>
+            <a:off x="6400800" y="1562100"/>
+            <a:ext cx="1588" cy="533400"/>
+          </a:xfrm>
+          <a:prstGeom prst="curvedConnector3">
+            <a:avLst>
+              <a:gd name="adj1" fmla="val 43460593"/>
+            </a:avLst>
+          </a:prstGeom>
+          <a:ln w="25400">
+            <a:tailEnd type="triangle" w="lg" len="lg"/>
+          </a:ln>
+        </p:spPr>
+        <p:style>
+          <a:lnRef idx="1">
+            <a:schemeClr val="accent1"/>
+          </a:lnRef>
+          <a:fillRef idx="0">
+            <a:schemeClr val="accent1"/>
+          </a:fillRef>
+          <a:effectRef idx="0">
+            <a:schemeClr val="accent1"/>
+          </a:effectRef>
+          <a:fontRef idx="minor">
+            <a:schemeClr val="tx1"/>
+          </a:fontRef>
+        </p:style>
+      </p:cxnSp>
+      <p:cxnSp>
+        <p:nvCxnSpPr>
+          <p:cNvPr id="81" name="Curved Connector 80"/>
+          <p:cNvCxnSpPr>
+            <a:stCxn id="19" idx="0"/>
+            <a:endCxn id="20" idx="0"/>
+          </p:cNvCxnSpPr>
+          <p:nvPr/>
+        </p:nvCxnSpPr>
+        <p:spPr>
+          <a:xfrm>
+            <a:off x="6400800" y="2095500"/>
+            <a:ext cx="1588" cy="990600"/>
+          </a:xfrm>
+          <a:prstGeom prst="curvedConnector3">
+            <a:avLst>
+              <a:gd name="adj1" fmla="val 49493026"/>
+            </a:avLst>
+          </a:prstGeom>
+          <a:ln w="25400">
+            <a:tailEnd type="triangle" w="lg" len="lg"/>
+          </a:ln>
         </p:spPr>
         <p:style>
           <a:lnRef idx="1">

</xml_diff>

<commit_message>
Update documentation up to 03-setting-up-project-structure.md
</commit_message>
<xml_diff>
--- a/doc/images/project-structure-initial.pptx
+++ b/doc/images/project-structure-initial.pptx
@@ -289,7 +289,7 @@
             <a:fld id="{464958D0-047A-4B5C-B600-9D705598A485}" type="datetimeFigureOut">
               <a:rPr lang="en-US" smtClean="0"/>
               <a:pPr/>
-              <a:t>12/18/2023</a:t>
+              <a:t>12/29/2023</a:t>
             </a:fld>
             <a:endParaRPr lang="en-US"/>
           </a:p>
@@ -456,7 +456,7 @@
             <a:fld id="{464958D0-047A-4B5C-B600-9D705598A485}" type="datetimeFigureOut">
               <a:rPr lang="en-US" smtClean="0"/>
               <a:pPr/>
-              <a:t>12/18/2023</a:t>
+              <a:t>12/29/2023</a:t>
             </a:fld>
             <a:endParaRPr lang="en-US"/>
           </a:p>
@@ -633,7 +633,7 @@
             <a:fld id="{464958D0-047A-4B5C-B600-9D705598A485}" type="datetimeFigureOut">
               <a:rPr lang="en-US" smtClean="0"/>
               <a:pPr/>
-              <a:t>12/18/2023</a:t>
+              <a:t>12/29/2023</a:t>
             </a:fld>
             <a:endParaRPr lang="en-US"/>
           </a:p>
@@ -800,7 +800,7 @@
             <a:fld id="{464958D0-047A-4B5C-B600-9D705598A485}" type="datetimeFigureOut">
               <a:rPr lang="en-US" smtClean="0"/>
               <a:pPr/>
-              <a:t>12/18/2023</a:t>
+              <a:t>12/29/2023</a:t>
             </a:fld>
             <a:endParaRPr lang="en-US"/>
           </a:p>
@@ -1043,7 +1043,7 @@
             <a:fld id="{464958D0-047A-4B5C-B600-9D705598A485}" type="datetimeFigureOut">
               <a:rPr lang="en-US" smtClean="0"/>
               <a:pPr/>
-              <a:t>12/18/2023</a:t>
+              <a:t>12/29/2023</a:t>
             </a:fld>
             <a:endParaRPr lang="en-US"/>
           </a:p>
@@ -1328,7 +1328,7 @@
             <a:fld id="{464958D0-047A-4B5C-B600-9D705598A485}" type="datetimeFigureOut">
               <a:rPr lang="en-US" smtClean="0"/>
               <a:pPr/>
-              <a:t>12/18/2023</a:t>
+              <a:t>12/29/2023</a:t>
             </a:fld>
             <a:endParaRPr lang="en-US"/>
           </a:p>
@@ -1747,7 +1747,7 @@
             <a:fld id="{464958D0-047A-4B5C-B600-9D705598A485}" type="datetimeFigureOut">
               <a:rPr lang="en-US" smtClean="0"/>
               <a:pPr/>
-              <a:t>12/18/2023</a:t>
+              <a:t>12/29/2023</a:t>
             </a:fld>
             <a:endParaRPr lang="en-US"/>
           </a:p>
@@ -1862,7 +1862,7 @@
             <a:fld id="{464958D0-047A-4B5C-B600-9D705598A485}" type="datetimeFigureOut">
               <a:rPr lang="en-US" smtClean="0"/>
               <a:pPr/>
-              <a:t>12/18/2023</a:t>
+              <a:t>12/29/2023</a:t>
             </a:fld>
             <a:endParaRPr lang="en-US"/>
           </a:p>
@@ -1954,7 +1954,7 @@
             <a:fld id="{464958D0-047A-4B5C-B600-9D705598A485}" type="datetimeFigureOut">
               <a:rPr lang="en-US" smtClean="0"/>
               <a:pPr/>
-              <a:t>12/18/2023</a:t>
+              <a:t>12/29/2023</a:t>
             </a:fld>
             <a:endParaRPr lang="en-US"/>
           </a:p>
@@ -2228,7 +2228,7 @@
             <a:fld id="{464958D0-047A-4B5C-B600-9D705598A485}" type="datetimeFigureOut">
               <a:rPr lang="en-US" smtClean="0"/>
               <a:pPr/>
-              <a:t>12/18/2023</a:t>
+              <a:t>12/29/2023</a:t>
             </a:fld>
             <a:endParaRPr lang="en-US"/>
           </a:p>
@@ -2478,7 +2478,7 @@
             <a:fld id="{464958D0-047A-4B5C-B600-9D705598A485}" type="datetimeFigureOut">
               <a:rPr lang="en-US" smtClean="0"/>
               <a:pPr/>
-              <a:t>12/18/2023</a:t>
+              <a:t>12/29/2023</a:t>
             </a:fld>
             <a:endParaRPr lang="en-US"/>
           </a:p>
@@ -2688,7 +2688,7 @@
             <a:fld id="{464958D0-047A-4B5C-B600-9D705598A485}" type="datetimeFigureOut">
               <a:rPr lang="en-US" smtClean="0"/>
               <a:pPr/>
-              <a:t>12/18/2023</a:t>
+              <a:t>12/29/2023</a:t>
             </a:fld>
             <a:endParaRPr lang="en-US"/>
           </a:p>
@@ -3295,8 +3295,8 @@
         </p:nvSpPr>
         <p:spPr>
           <a:xfrm>
-            <a:off x="2667000" y="1905000"/>
-            <a:ext cx="762000" cy="381000"/>
+            <a:off x="2514600" y="1905000"/>
+            <a:ext cx="990600" cy="381000"/>
           </a:xfrm>
           <a:prstGeom prst="rect">
             <a:avLst/>
@@ -3340,7 +3340,7 @@
         <p:spPr>
           <a:xfrm>
             <a:off x="3810000" y="1905000"/>
-            <a:ext cx="1066800" cy="381000"/>
+            <a:ext cx="1143000" cy="381000"/>
           </a:xfrm>
           <a:prstGeom prst="rect">
             <a:avLst/>
@@ -3384,7 +3384,7 @@
         <p:spPr>
           <a:xfrm>
             <a:off x="3810000" y="2362200"/>
-            <a:ext cx="1066800" cy="381000"/>
+            <a:ext cx="1143000" cy="381000"/>
           </a:xfrm>
           <a:prstGeom prst="rect">
             <a:avLst/>
@@ -3427,8 +3427,8 @@
         </p:nvSpPr>
         <p:spPr>
           <a:xfrm>
-            <a:off x="2667000" y="2895600"/>
-            <a:ext cx="762000" cy="381000"/>
+            <a:off x="2514600" y="2895600"/>
+            <a:ext cx="990600" cy="381000"/>
           </a:xfrm>
           <a:prstGeom prst="rect">
             <a:avLst/>
@@ -3472,7 +3472,7 @@
         <p:spPr>
           <a:xfrm>
             <a:off x="3810000" y="2895600"/>
-            <a:ext cx="1066800" cy="381000"/>
+            <a:ext cx="1143000" cy="381000"/>
           </a:xfrm>
           <a:prstGeom prst="rect">
             <a:avLst/>
@@ -3501,7 +3501,7 @@
             <a:pPr algn="ctr"/>
             <a:r>
               <a:rPr lang="en-US" sz="1100" dirty="0" smtClean="0"/>
-              <a:t>00-build-image</a:t>
+              <a:t>02-setting-up-a-project-image</a:t>
             </a:r>
             <a:endParaRPr lang="en-US" sz="1100" dirty="0"/>
           </a:p>
@@ -3787,8 +3787,8 @@
         </p:nvSpPr>
         <p:spPr>
           <a:xfrm>
-            <a:off x="2667000" y="3429000"/>
-            <a:ext cx="762000" cy="381000"/>
+            <a:off x="2514600" y="3429000"/>
+            <a:ext cx="990600" cy="381000"/>
           </a:xfrm>
           <a:prstGeom prst="rect">
             <a:avLst/>
@@ -3817,7 +3817,7 @@
             <a:pPr algn="ctr"/>
             <a:r>
               <a:rPr lang="en-US" sz="1100" dirty="0" smtClean="0"/>
-              <a:t>00-build</a:t>
+              <a:t>02-setting-up-a-project</a:t>
             </a:r>
             <a:endParaRPr lang="en-US" sz="1100" dirty="0"/>
           </a:p>
@@ -3832,7 +3832,7 @@
         <p:spPr>
           <a:xfrm>
             <a:off x="3810000" y="3429000"/>
-            <a:ext cx="1066800" cy="381000"/>
+            <a:ext cx="1143000" cy="381000"/>
           </a:xfrm>
           <a:prstGeom prst="rect">
             <a:avLst/>
@@ -3950,7 +3950,7 @@
         <p:spPr>
           <a:xfrm>
             <a:off x="3810000" y="3886200"/>
-            <a:ext cx="1066800" cy="381000"/>
+            <a:ext cx="1143000" cy="381000"/>
           </a:xfrm>
           <a:prstGeom prst="rect">
             <a:avLst/>
@@ -4537,7 +4537,7 @@
         <p:spPr>
           <a:xfrm>
             <a:off x="2286000" y="2095500"/>
-            <a:ext cx="381000" cy="1588"/>
+            <a:ext cx="228600" cy="1588"/>
           </a:xfrm>
           <a:prstGeom prst="bentConnector3">
             <a:avLst>
@@ -4571,8 +4571,8 @@
         </p:nvCxnSpPr>
         <p:spPr>
           <a:xfrm>
-            <a:off x="3429000" y="2095500"/>
-            <a:ext cx="381000" cy="1588"/>
+            <a:off x="3505200" y="2095500"/>
+            <a:ext cx="304800" cy="1588"/>
           </a:xfrm>
           <a:prstGeom prst="bentConnector3">
             <a:avLst>
@@ -4606,8 +4606,8 @@
         </p:nvCxnSpPr>
         <p:spPr>
           <a:xfrm>
-            <a:off x="3429000" y="2095500"/>
-            <a:ext cx="381000" cy="457200"/>
+            <a:off x="3505200" y="2095500"/>
+            <a:ext cx="304800" cy="457200"/>
           </a:xfrm>
           <a:prstGeom prst="bentConnector3">
             <a:avLst>
@@ -4642,7 +4642,7 @@
         <p:spPr>
           <a:xfrm>
             <a:off x="2286000" y="3086100"/>
-            <a:ext cx="381000" cy="1588"/>
+            <a:ext cx="228600" cy="1588"/>
           </a:xfrm>
           <a:prstGeom prst="bentConnector3">
             <a:avLst>
@@ -4676,8 +4676,8 @@
         </p:nvCxnSpPr>
         <p:spPr>
           <a:xfrm>
-            <a:off x="3429000" y="3086100"/>
-            <a:ext cx="381000" cy="1588"/>
+            <a:off x="3505200" y="3086100"/>
+            <a:ext cx="304800" cy="1588"/>
           </a:xfrm>
           <a:prstGeom prst="bentConnector3">
             <a:avLst>
@@ -4711,8 +4711,8 @@
         </p:nvCxnSpPr>
         <p:spPr>
           <a:xfrm>
-            <a:off x="4876800" y="3086100"/>
-            <a:ext cx="304800" cy="1588"/>
+            <a:off x="4953000" y="3086100"/>
+            <a:ext cx="228600" cy="1588"/>
           </a:xfrm>
           <a:prstGeom prst="bentConnector3">
             <a:avLst>
@@ -4746,8 +4746,8 @@
         </p:nvCxnSpPr>
         <p:spPr>
           <a:xfrm>
-            <a:off x="4876800" y="2095500"/>
-            <a:ext cx="304800" cy="1588"/>
+            <a:off x="4953000" y="2095500"/>
+            <a:ext cx="228600" cy="1588"/>
           </a:xfrm>
           <a:prstGeom prst="bentConnector3">
             <a:avLst>
@@ -4782,7 +4782,7 @@
         <p:spPr>
           <a:xfrm>
             <a:off x="2286000" y="3619500"/>
-            <a:ext cx="381000" cy="1588"/>
+            <a:ext cx="228600" cy="1588"/>
           </a:xfrm>
           <a:prstGeom prst="bentConnector3">
             <a:avLst>
@@ -4816,8 +4816,8 @@
         </p:nvCxnSpPr>
         <p:spPr>
           <a:xfrm>
-            <a:off x="3429000" y="3619500"/>
-            <a:ext cx="381000" cy="1588"/>
+            <a:off x="3505200" y="3619500"/>
+            <a:ext cx="304800" cy="1588"/>
           </a:xfrm>
           <a:prstGeom prst="bentConnector3">
             <a:avLst>
@@ -4851,8 +4851,8 @@
         </p:nvCxnSpPr>
         <p:spPr>
           <a:xfrm>
-            <a:off x="4876800" y="3619500"/>
-            <a:ext cx="304800" cy="1588"/>
+            <a:off x="4953000" y="3619500"/>
+            <a:ext cx="228600" cy="1588"/>
           </a:xfrm>
           <a:prstGeom prst="bentConnector3">
             <a:avLst>
@@ -4886,8 +4886,8 @@
         </p:nvCxnSpPr>
         <p:spPr>
           <a:xfrm>
-            <a:off x="4876800" y="4076700"/>
-            <a:ext cx="304800" cy="1588"/>
+            <a:off x="4953000" y="4076700"/>
+            <a:ext cx="228600" cy="1588"/>
           </a:xfrm>
           <a:prstGeom prst="bentConnector3">
             <a:avLst>
@@ -4921,8 +4921,8 @@
         </p:nvCxnSpPr>
         <p:spPr>
           <a:xfrm>
-            <a:off x="3429000" y="3619500"/>
-            <a:ext cx="381000" cy="457200"/>
+            <a:off x="3505200" y="3619500"/>
+            <a:ext cx="304800" cy="457200"/>
           </a:xfrm>
           <a:prstGeom prst="bentConnector3">
             <a:avLst>
@@ -4956,8 +4956,8 @@
         </p:nvCxnSpPr>
         <p:spPr>
           <a:xfrm>
-            <a:off x="3429000" y="3619500"/>
-            <a:ext cx="381000" cy="914400"/>
+            <a:off x="3505200" y="3619500"/>
+            <a:ext cx="304800" cy="914400"/>
           </a:xfrm>
           <a:prstGeom prst="bentConnector3">
             <a:avLst>
@@ -4991,8 +4991,8 @@
         </p:nvCxnSpPr>
         <p:spPr>
           <a:xfrm>
-            <a:off x="3429000" y="3619500"/>
-            <a:ext cx="381000" cy="1371600"/>
+            <a:off x="3505200" y="3619500"/>
+            <a:ext cx="304800" cy="1371600"/>
           </a:xfrm>
           <a:prstGeom prst="bentConnector3">
             <a:avLst>
@@ -5026,8 +5026,8 @@
         </p:nvCxnSpPr>
         <p:spPr>
           <a:xfrm>
-            <a:off x="3429000" y="3619500"/>
-            <a:ext cx="381000" cy="2286000"/>
+            <a:off x="3505200" y="3619500"/>
+            <a:ext cx="304800" cy="2286000"/>
           </a:xfrm>
           <a:prstGeom prst="bentConnector3">
             <a:avLst>
@@ -5061,8 +5061,8 @@
         </p:nvCxnSpPr>
         <p:spPr>
           <a:xfrm>
-            <a:off x="3429000" y="3619500"/>
-            <a:ext cx="381000" cy="2743200"/>
+            <a:off x="3505200" y="3619500"/>
+            <a:ext cx="304800" cy="2743200"/>
           </a:xfrm>
           <a:prstGeom prst="bentConnector3">
             <a:avLst>
@@ -5179,15 +5179,7 @@
                   <a:schemeClr val="tx1"/>
                 </a:solidFill>
               </a:rPr>
-              <a:t>s</a:t>
-            </a:r>
-            <a:r>
-              <a:rPr lang="en-US" sz="1100" dirty="0" err="1" smtClean="0">
-                <a:solidFill>
-                  <a:schemeClr val="tx1"/>
-                </a:solidFill>
-              </a:rPr>
-              <a:t>tart.S</a:t>
+              <a:t>start.S</a:t>
             </a:r>
             <a:endParaRPr lang="en-US" sz="1100" dirty="0">
               <a:solidFill>
@@ -5208,8 +5200,8 @@
         </p:nvCxnSpPr>
         <p:spPr>
           <a:xfrm>
-            <a:off x="3429000" y="3619500"/>
-            <a:ext cx="381000" cy="1828800"/>
+            <a:off x="3505200" y="3619500"/>
+            <a:ext cx="304800" cy="1828800"/>
           </a:xfrm>
           <a:prstGeom prst="bentConnector3">
             <a:avLst>

</xml_diff>